<commit_message>
Modificacion Mockups y Presentación
</commit_message>
<xml_diff>
--- a/Presentaciones/Presentación2.pptx
+++ b/Presentaciones/Presentación2.pptx
@@ -32,9 +32,10 @@
     <p:sldId id="280" r:id="rId26"/>
     <p:sldId id="281" r:id="rId27"/>
     <p:sldId id="282" r:id="rId28"/>
-    <p:sldId id="283" r:id="rId29"/>
-    <p:sldId id="284" r:id="rId30"/>
-    <p:sldId id="285" r:id="rId31"/>
+    <p:sldId id="286" r:id="rId29"/>
+    <p:sldId id="283" r:id="rId30"/>
+    <p:sldId id="284" r:id="rId31"/>
+    <p:sldId id="285" r:id="rId32"/>
   </p:sldIdLst>
   <p:sldSz cx="16202025" cy="10801350"/>
   <p:notesSz cx="6858000" cy="9144000"/>
@@ -4608,7 +4609,7 @@
       </p:grpSpPr>
       <p:pic>
         <p:nvPicPr>
-          <p:cNvPr id="27650" name="Picture 2" descr="C:\Users\Prof9_Apoyo\Documents\DocumentosDesarrollo\mockups\ReporteEspecialTotales3.png"/>
+          <p:cNvPr id="1026" name="Picture 2" descr="C:\Users\Prof9_Apoyo\Documents\DocumentosDesarrollo\mockups\ReporteEspecialTotales31.png"/>
           <p:cNvPicPr>
             <a:picLocks noChangeAspect="1" noChangeArrowheads="1"/>
           </p:cNvPicPr>
@@ -4629,8 +4630,8 @@
         </p:blipFill>
         <p:spPr bwMode="auto">
           <a:xfrm>
-            <a:off x="3780532" y="648147"/>
-            <a:ext cx="8064896" cy="9438727"/>
+            <a:off x="3708524" y="605669"/>
+            <a:ext cx="8280920" cy="9691550"/>
           </a:xfrm>
           <a:prstGeom prst="rect">
             <a:avLst/>
@@ -4686,7 +4687,7 @@
       </p:grpSpPr>
       <p:pic>
         <p:nvPicPr>
-          <p:cNvPr id="28674" name="Picture 2" descr="C:\Users\Prof9_Apoyo\Documents\DocumentosDesarrollo\mockups\ReporteEspecialColumna1.png"/>
+          <p:cNvPr id="2050" name="Picture 2" descr="C:\Users\Prof9_Apoyo\Documents\DocumentosDesarrollo\mockups\ReporteEspecialTotales32.png"/>
           <p:cNvPicPr>
             <a:picLocks noChangeAspect="1" noChangeArrowheads="1"/>
           </p:cNvPicPr>
@@ -4707,8 +4708,8 @@
         </p:blipFill>
         <p:spPr bwMode="auto">
           <a:xfrm>
-            <a:off x="4212580" y="792163"/>
-            <a:ext cx="7560840" cy="9195994"/>
+            <a:off x="3564508" y="437120"/>
+            <a:ext cx="8424936" cy="9860099"/>
           </a:xfrm>
           <a:prstGeom prst="rect">
             <a:avLst/>
@@ -4728,7 +4729,7 @@
     </p:spTree>
     <p:extLst>
       <p:ext uri="{BB962C8B-B14F-4D97-AF65-F5344CB8AC3E}">
-        <p14:creationId xmlns:p14="http://schemas.microsoft.com/office/powerpoint/2010/main" val="966087355"/>
+        <p14:creationId xmlns:p14="http://schemas.microsoft.com/office/powerpoint/2010/main" val="17850581"/>
       </p:ext>
     </p:extLst>
   </p:cSld>
@@ -4764,7 +4765,7 @@
       </p:grpSpPr>
       <p:pic>
         <p:nvPicPr>
-          <p:cNvPr id="29698" name="Picture 2" descr="C:\Users\Prof9_Apoyo\Documents\DocumentosDesarrollo\mockups\ReporteEspecialColumna2.png"/>
+          <p:cNvPr id="28674" name="Picture 2" descr="C:\Users\Prof9_Apoyo\Documents\DocumentosDesarrollo\mockups\ReporteEspecialColumna1.png"/>
           <p:cNvPicPr>
             <a:picLocks noChangeAspect="1" noChangeArrowheads="1"/>
           </p:cNvPicPr>
@@ -4785,8 +4786,8 @@
         </p:blipFill>
         <p:spPr bwMode="auto">
           <a:xfrm>
-            <a:off x="3492500" y="648147"/>
-            <a:ext cx="7848872" cy="9185904"/>
+            <a:off x="4212580" y="792163"/>
+            <a:ext cx="7560840" cy="9195994"/>
           </a:xfrm>
           <a:prstGeom prst="rect">
             <a:avLst/>
@@ -4902,6 +4903,84 @@
 </file>
 
 <file path=ppt/slides/slide30.xml><?xml version="1.0" encoding="utf-8"?>
+<p:sld xmlns:a="http://schemas.openxmlformats.org/drawingml/2006/main" xmlns:r="http://schemas.openxmlformats.org/officeDocument/2006/relationships" xmlns:p="http://schemas.openxmlformats.org/presentationml/2006/main">
+  <p:cSld>
+    <p:spTree>
+      <p:nvGrpSpPr>
+        <p:cNvPr id="1" name=""/>
+        <p:cNvGrpSpPr/>
+        <p:nvPr/>
+      </p:nvGrpSpPr>
+      <p:grpSpPr>
+        <a:xfrm>
+          <a:off x="0" y="0"/>
+          <a:ext cx="0" cy="0"/>
+          <a:chOff x="0" y="0"/>
+          <a:chExt cx="0" cy="0"/>
+        </a:xfrm>
+      </p:grpSpPr>
+      <p:pic>
+        <p:nvPicPr>
+          <p:cNvPr id="29698" name="Picture 2" descr="C:\Users\Prof9_Apoyo\Documents\DocumentosDesarrollo\mockups\ReporteEspecialColumna2.png"/>
+          <p:cNvPicPr>
+            <a:picLocks noChangeAspect="1" noChangeArrowheads="1"/>
+          </p:cNvPicPr>
+          <p:nvPr/>
+        </p:nvPicPr>
+        <p:blipFill>
+          <a:blip r:embed="rId2">
+            <a:extLst>
+              <a:ext uri="{28A0092B-C50C-407E-A947-70E740481C1C}">
+                <a14:useLocalDpi xmlns:a14="http://schemas.microsoft.com/office/drawing/2010/main" val="0"/>
+              </a:ext>
+            </a:extLst>
+          </a:blip>
+          <a:srcRect/>
+          <a:stretch>
+            <a:fillRect/>
+          </a:stretch>
+        </p:blipFill>
+        <p:spPr bwMode="auto">
+          <a:xfrm>
+            <a:off x="3492500" y="648147"/>
+            <a:ext cx="7848872" cy="9185904"/>
+          </a:xfrm>
+          <a:prstGeom prst="rect">
+            <a:avLst/>
+          </a:prstGeom>
+          <a:noFill/>
+          <a:extLst>
+            <a:ext uri="{909E8E84-426E-40DD-AFC4-6F175D3DCCD1}">
+              <a14:hiddenFill xmlns:a14="http://schemas.microsoft.com/office/drawing/2010/main">
+                <a:solidFill>
+                  <a:srgbClr val="FFFFFF"/>
+                </a:solidFill>
+              </a14:hiddenFill>
+            </a:ext>
+          </a:extLst>
+        </p:spPr>
+      </p:pic>
+    </p:spTree>
+    <p:extLst>
+      <p:ext uri="{BB962C8B-B14F-4D97-AF65-F5344CB8AC3E}">
+        <p14:creationId xmlns:p14="http://schemas.microsoft.com/office/powerpoint/2010/main" val="966087355"/>
+      </p:ext>
+    </p:extLst>
+  </p:cSld>
+  <p:clrMapOvr>
+    <a:masterClrMapping/>
+  </p:clrMapOvr>
+  <p:timing>
+    <p:tnLst>
+      <p:par>
+        <p:cTn id="1" dur="indefinite" restart="never" nodeType="tmRoot"/>
+      </p:par>
+    </p:tnLst>
+  </p:timing>
+</p:sld>
+</file>
+
+<file path=ppt/slides/slide31.xml><?xml version="1.0" encoding="utf-8"?>
 <p:sld xmlns:a="http://schemas.openxmlformats.org/drawingml/2006/main" xmlns:r="http://schemas.openxmlformats.org/officeDocument/2006/relationships" xmlns:p="http://schemas.openxmlformats.org/presentationml/2006/main">
   <p:cSld>
     <p:spTree>

</xml_diff>